<commit_message>
kotlin advanced - Kotlin - 2 Java Interoperability minor fixes
</commit_message>
<xml_diff>
--- a/slides/Kotlin - 2. Java Interoperability.pptx
+++ b/slides/Kotlin - 2. Java Interoperability.pptx
@@ -239,7 +239,7 @@
             <a:fld id="{B7CEC25C-B4E9-458D-8E4B-2C06A129DA19}" type="datetimeFigureOut">
               <a:rPr lang="cs-CZ" smtClean="0"/>
               <a:pPr/>
-              <a:t>25.01.2019</a:t>
+              <a:t>12.02.2019</a:t>
             </a:fld>
             <a:endParaRPr lang="cs-CZ"/>
           </a:p>
@@ -554,43 +554,13 @@
           <a:bodyPr/>
           <a:lstStyle/>
           <a:p>
-            <a:pPr marL="171450" indent="-171450">
-              <a:buFontTx/>
-              <a:buChar char="-"/>
-            </a:pPr>
-            <a:r>
-              <a:rPr lang="cs-CZ" dirty="0" smtClean="0"/>
-              <a:t>Mimo třídu – stejně jako obyčejná funkce. Bude z ní statická metoda uvnitř třídy jejíž</a:t>
-            </a:r>
-            <a:r>
-              <a:rPr lang="cs-CZ" baseline="0" dirty="0" smtClean="0"/>
-              <a:t> název bude odpovídat názvu souboru, ale bude mít navíc první parametr, kterým bude </a:t>
-            </a:r>
-            <a:r>
-              <a:rPr lang="cs-CZ" baseline="0" dirty="0" err="1" smtClean="0"/>
-              <a:t>receiver</a:t>
-            </a:r>
-            <a:r>
-              <a:rPr lang="cs-CZ" baseline="0" dirty="0" smtClean="0"/>
-              <a:t>.</a:t>
-            </a:r>
-          </a:p>
-          <a:p>
-            <a:pPr marL="171450" indent="-171450">
-              <a:buFontTx/>
-              <a:buChar char="-"/>
-            </a:pPr>
-            <a:r>
-              <a:rPr lang="cs-CZ" baseline="0" dirty="0" smtClean="0"/>
-              <a:t>Uvnitř třídy – stane se z ní normální nestatická metoda, která ale bude mít navíc první parametr, kterým bude </a:t>
-            </a:r>
-            <a:r>
-              <a:rPr lang="cs-CZ" baseline="0" dirty="0" err="1" smtClean="0"/>
-              <a:t>recevier</a:t>
-            </a:r>
-            <a:r>
-              <a:rPr lang="cs-CZ" baseline="0" dirty="0" smtClean="0"/>
-              <a:t> – použití na nic. Volám na objektu, ale jako parametr musím předat ten samý objekt.</a:t>
+            <a:r>
+              <a:rPr lang="en-US" dirty="0" err="1" smtClean="0"/>
+              <a:t>Jak</a:t>
+            </a:r>
+            <a:r>
+              <a:rPr lang="en-US" baseline="0" dirty="0" smtClean="0"/>
+              <a:t> </a:t>
             </a:r>
             <a:endParaRPr lang="cs-CZ" dirty="0"/>
           </a:p>
@@ -614,7 +584,7 @@
             <a:fld id="{27886F17-B5D0-472B-8745-C3F2BDEA3FAA}" type="slidenum">
               <a:rPr lang="cs-CZ" smtClean="0"/>
               <a:pPr/>
-              <a:t>5</a:t>
+              <a:t>2</a:t>
             </a:fld>
             <a:endParaRPr lang="cs-CZ"/>
           </a:p>
@@ -623,7 +593,7 @@
     </p:spTree>
     <p:extLst>
       <p:ext uri="{BB962C8B-B14F-4D97-AF65-F5344CB8AC3E}">
-        <p14:creationId xmlns:p14="http://schemas.microsoft.com/office/powerpoint/2010/main" val="1853825064"/>
+        <p14:creationId xmlns:p14="http://schemas.microsoft.com/office/powerpoint/2010/main" val="4094413457"/>
       </p:ext>
     </p:extLst>
   </p:cSld>
@@ -677,6 +647,129 @@
           <a:bodyPr/>
           <a:lstStyle/>
           <a:p>
+            <a:pPr marL="171450" indent="-171450">
+              <a:buFontTx/>
+              <a:buChar char="-"/>
+            </a:pPr>
+            <a:r>
+              <a:rPr lang="cs-CZ" dirty="0" smtClean="0"/>
+              <a:t>Mimo třídu – stejně jako obyčejná funkce. Bude z ní statická metoda uvnitř třídy jejíž</a:t>
+            </a:r>
+            <a:r>
+              <a:rPr lang="cs-CZ" baseline="0" dirty="0" smtClean="0"/>
+              <a:t> název bude odpovídat názvu souboru, ale bude mít navíc první parametr, kterým bude </a:t>
+            </a:r>
+            <a:r>
+              <a:rPr lang="cs-CZ" baseline="0" dirty="0" err="1" smtClean="0"/>
+              <a:t>receiver</a:t>
+            </a:r>
+            <a:r>
+              <a:rPr lang="cs-CZ" baseline="0" dirty="0" smtClean="0"/>
+              <a:t>.</a:t>
+            </a:r>
+          </a:p>
+          <a:p>
+            <a:pPr marL="171450" indent="-171450">
+              <a:buFontTx/>
+              <a:buChar char="-"/>
+            </a:pPr>
+            <a:r>
+              <a:rPr lang="cs-CZ" baseline="0" dirty="0" smtClean="0"/>
+              <a:t>Uvnitř třídy – stane se z ní normální nestatická metoda, která ale bude mít navíc první parametr, kterým bude </a:t>
+            </a:r>
+            <a:r>
+              <a:rPr lang="cs-CZ" baseline="0" dirty="0" err="1" smtClean="0"/>
+              <a:t>recevier</a:t>
+            </a:r>
+            <a:r>
+              <a:rPr lang="cs-CZ" baseline="0" dirty="0" smtClean="0"/>
+              <a:t> – použití na nic. Volám na objektu, ale jako parametr musím předat ten samý objekt.</a:t>
+            </a:r>
+            <a:endParaRPr lang="cs-CZ" dirty="0"/>
+          </a:p>
+        </p:txBody>
+      </p:sp>
+      <p:sp>
+        <p:nvSpPr>
+          <p:cNvPr id="4" name="Zástupný symbol pro číslo snímku 3"/>
+          <p:cNvSpPr>
+            <a:spLocks noGrp="1"/>
+          </p:cNvSpPr>
+          <p:nvPr>
+            <p:ph type="sldNum" sz="quarter" idx="10"/>
+          </p:nvPr>
+        </p:nvSpPr>
+        <p:spPr/>
+        <p:txBody>
+          <a:bodyPr/>
+          <a:lstStyle/>
+          <a:p>
+            <a:fld id="{27886F17-B5D0-472B-8745-C3F2BDEA3FAA}" type="slidenum">
+              <a:rPr lang="cs-CZ" smtClean="0"/>
+              <a:pPr/>
+              <a:t>5</a:t>
+            </a:fld>
+            <a:endParaRPr lang="cs-CZ"/>
+          </a:p>
+        </p:txBody>
+      </p:sp>
+    </p:spTree>
+    <p:extLst>
+      <p:ext uri="{BB962C8B-B14F-4D97-AF65-F5344CB8AC3E}">
+        <p14:creationId xmlns:p14="http://schemas.microsoft.com/office/powerpoint/2010/main" val="1853825064"/>
+      </p:ext>
+    </p:extLst>
+  </p:cSld>
+  <p:clrMapOvr>
+    <a:masterClrMapping/>
+  </p:clrMapOvr>
+</p:notes>
+</file>
+
+<file path=ppt/notesSlides/notesSlide3.xml><?xml version="1.0" encoding="utf-8"?>
+<p:notes xmlns:a="http://schemas.openxmlformats.org/drawingml/2006/main" xmlns:r="http://schemas.openxmlformats.org/officeDocument/2006/relationships" xmlns:p="http://schemas.openxmlformats.org/presentationml/2006/main">
+  <p:cSld>
+    <p:spTree>
+      <p:nvGrpSpPr>
+        <p:cNvPr id="1" name=""/>
+        <p:cNvGrpSpPr/>
+        <p:nvPr/>
+      </p:nvGrpSpPr>
+      <p:grpSpPr>
+        <a:xfrm>
+          <a:off x="0" y="0"/>
+          <a:ext cx="0" cy="0"/>
+          <a:chOff x="0" y="0"/>
+          <a:chExt cx="0" cy="0"/>
+        </a:xfrm>
+      </p:grpSpPr>
+      <p:sp>
+        <p:nvSpPr>
+          <p:cNvPr id="2" name="Zástupný symbol pro obrázek snímku 1"/>
+          <p:cNvSpPr>
+            <a:spLocks noGrp="1" noRot="1" noChangeAspect="1"/>
+          </p:cNvSpPr>
+          <p:nvPr>
+            <p:ph type="sldImg"/>
+          </p:nvPr>
+        </p:nvSpPr>
+        <p:spPr/>
+      </p:sp>
+      <p:sp>
+        <p:nvSpPr>
+          <p:cNvPr id="3" name="Zástupný symbol pro poznámky 2"/>
+          <p:cNvSpPr>
+            <a:spLocks noGrp="1"/>
+          </p:cNvSpPr>
+          <p:nvPr>
+            <p:ph type="body" idx="1"/>
+          </p:nvPr>
+        </p:nvSpPr>
+        <p:spPr/>
+        <p:txBody>
+          <a:bodyPr/>
+          <a:lstStyle/>
+          <a:p>
             <a:r>
               <a:rPr lang="en-US" dirty="0" smtClean="0"/>
               <a:t>@</a:t>
@@ -738,7 +831,7 @@
 </p:notes>
 </file>
 
-<file path=ppt/notesSlides/notesSlide3.xml><?xml version="1.0" encoding="utf-8"?>
+<file path=ppt/notesSlides/notesSlide4.xml><?xml version="1.0" encoding="utf-8"?>
 <p:notes xmlns:a="http://schemas.openxmlformats.org/drawingml/2006/main" xmlns:r="http://schemas.openxmlformats.org/officeDocument/2006/relationships" xmlns:p="http://schemas.openxmlformats.org/presentationml/2006/main">
   <p:cSld>
     <p:spTree>
@@ -12438,6 +12531,34 @@
               <a:tabLst/>
             </a:pPr>
             <a:r>
+              <a:rPr kumimoji="0" lang="cs-CZ" altLang="cs-CZ" sz="1600" b="1" i="0" u="none" strike="noStrike" cap="none" normalizeH="0" baseline="0" dirty="0" err="1" smtClean="0">
+                <a:ln>
+                  <a:noFill/>
+                </a:ln>
+                <a:solidFill>
+                  <a:srgbClr val="000080"/>
+                </a:solidFill>
+                <a:effectLst/>
+                <a:latin typeface="Courier New" panose="02070309020205020404" pitchFamily="49" charset="0"/>
+                <a:cs typeface="Courier New" panose="02070309020205020404" pitchFamily="49" charset="0"/>
+              </a:rPr>
+              <a:t>va</a:t>
+            </a:r>
+            <a:r>
+              <a:rPr kumimoji="0" lang="en-US" altLang="cs-CZ" sz="1600" b="1" i="0" u="none" strike="noStrike" cap="none" normalizeH="0" baseline="0" dirty="0" smtClean="0">
+                <a:ln>
+                  <a:noFill/>
+                </a:ln>
+                <a:solidFill>
+                  <a:srgbClr val="000080"/>
+                </a:solidFill>
+                <a:effectLst/>
+                <a:latin typeface="Courier New" panose="02070309020205020404" pitchFamily="49" charset="0"/>
+                <a:cs typeface="Courier New" panose="02070309020205020404" pitchFamily="49" charset="0"/>
+              </a:rPr>
+              <a:t>r</a:t>
+            </a:r>
+            <a:r>
               <a:rPr kumimoji="0" lang="cs-CZ" altLang="cs-CZ" sz="1600" b="1" i="0" u="none" strike="noStrike" cap="none" normalizeH="0" baseline="0" dirty="0" smtClean="0">
                 <a:ln>
                   <a:noFill/>
@@ -12449,7 +12570,21 @@
                 <a:latin typeface="Courier New" panose="02070309020205020404" pitchFamily="49" charset="0"/>
                 <a:cs typeface="Courier New" panose="02070309020205020404" pitchFamily="49" charset="0"/>
               </a:rPr>
-              <a:t>val </a:t>
+              <a:t> </a:t>
+            </a:r>
+            <a:r>
+              <a:rPr kumimoji="0" lang="en-US" altLang="cs-CZ" sz="1600" b="0" i="0" u="none" strike="noStrike" cap="none" normalizeH="0" baseline="0" dirty="0" err="1" smtClean="0">
+                <a:ln>
+                  <a:noFill/>
+                </a:ln>
+                <a:solidFill>
+                  <a:srgbClr val="000000"/>
+                </a:solidFill>
+                <a:effectLst/>
+                <a:latin typeface="Courier New" panose="02070309020205020404" pitchFamily="49" charset="0"/>
+                <a:cs typeface="Courier New" panose="02070309020205020404" pitchFamily="49" charset="0"/>
+              </a:rPr>
+              <a:t>firstN</a:t>
             </a:r>
             <a:r>
               <a:rPr kumimoji="0" lang="cs-CZ" altLang="cs-CZ" sz="1600" b="0" i="0" u="none" strike="noStrike" cap="none" normalizeH="0" baseline="0" dirty="0" err="1" smtClean="0">
@@ -12463,7 +12598,7 @@
                 <a:latin typeface="Courier New" panose="02070309020205020404" pitchFamily="49" charset="0"/>
                 <a:cs typeface="Courier New" panose="02070309020205020404" pitchFamily="49" charset="0"/>
               </a:rPr>
-              <a:t>name</a:t>
+              <a:t>ame</a:t>
             </a:r>
             <a:r>
               <a:rPr kumimoji="0" lang="cs-CZ" altLang="cs-CZ" sz="1600" b="0" i="0" u="none" strike="noStrike" cap="none" normalizeH="0" baseline="0" dirty="0" smtClean="0">
@@ -13619,6 +13754,34 @@
               <a:tabLst/>
             </a:pPr>
             <a:r>
+              <a:rPr kumimoji="0" lang="cs-CZ" altLang="cs-CZ" sz="1600" b="1" i="0" u="none" strike="noStrike" cap="none" normalizeH="0" baseline="0" dirty="0" err="1" smtClean="0">
+                <a:ln>
+                  <a:noFill/>
+                </a:ln>
+                <a:solidFill>
+                  <a:srgbClr val="000080"/>
+                </a:solidFill>
+                <a:effectLst/>
+                <a:latin typeface="Courier New" panose="02070309020205020404" pitchFamily="49" charset="0"/>
+                <a:cs typeface="Courier New" panose="02070309020205020404" pitchFamily="49" charset="0"/>
+              </a:rPr>
+              <a:t>va</a:t>
+            </a:r>
+            <a:r>
+              <a:rPr kumimoji="0" lang="en-US" altLang="cs-CZ" sz="1600" b="1" i="0" u="none" strike="noStrike" cap="none" normalizeH="0" baseline="0" dirty="0" smtClean="0">
+                <a:ln>
+                  <a:noFill/>
+                </a:ln>
+                <a:solidFill>
+                  <a:srgbClr val="000080"/>
+                </a:solidFill>
+                <a:effectLst/>
+                <a:latin typeface="Courier New" panose="02070309020205020404" pitchFamily="49" charset="0"/>
+                <a:cs typeface="Courier New" panose="02070309020205020404" pitchFamily="49" charset="0"/>
+              </a:rPr>
+              <a:t>r</a:t>
+            </a:r>
+            <a:r>
               <a:rPr kumimoji="0" lang="cs-CZ" altLang="cs-CZ" sz="1600" b="1" i="0" u="none" strike="noStrike" cap="none" normalizeH="0" baseline="0" dirty="0" smtClean="0">
                 <a:ln>
                   <a:noFill/>
@@ -13630,7 +13793,7 @@
                 <a:latin typeface="Courier New" panose="02070309020205020404" pitchFamily="49" charset="0"/>
                 <a:cs typeface="Courier New" panose="02070309020205020404" pitchFamily="49" charset="0"/>
               </a:rPr>
-              <a:t>val </a:t>
+              <a:t> </a:t>
             </a:r>
             <a:r>
               <a:rPr kumimoji="0" lang="cs-CZ" altLang="cs-CZ" sz="1600" b="0" i="0" u="none" strike="noStrike" cap="none" normalizeH="0" baseline="0" dirty="0" err="1" smtClean="0">

</xml_diff>

<commit_message>
kotlin advanced - interoperability - formatting
</commit_message>
<xml_diff>
--- a/slides/Kotlin - 2. Java Interoperability.pptx
+++ b/slides/Kotlin - 2. Java Interoperability.pptx
@@ -239,7 +239,7 @@
             <a:fld id="{B7CEC25C-B4E9-458D-8E4B-2C06A129DA19}" type="datetimeFigureOut">
               <a:rPr lang="cs-CZ" smtClean="0"/>
               <a:pPr/>
-              <a:t>12.02.2019</a:t>
+              <a:t>25.02.2019</a:t>
             </a:fld>
             <a:endParaRPr lang="cs-CZ"/>
           </a:p>
@@ -18383,8 +18383,8 @@
         </p:nvSpPr>
         <p:spPr bwMode="auto">
           <a:xfrm>
-            <a:off x="251520" y="1987769"/>
-            <a:ext cx="5544616" cy="1323439"/>
+            <a:off x="251520" y="2110879"/>
+            <a:ext cx="6120680" cy="1077218"/>
           </a:xfrm>
           <a:prstGeom prst="rect">
             <a:avLst/>

</xml_diff>

<commit_message>
kotlin advanced - interoperability slides fix
</commit_message>
<xml_diff>
--- a/slides/Kotlin - 2. Java Interoperability.pptx
+++ b/slides/Kotlin - 2. Java Interoperability.pptx
@@ -15034,7 +15034,21 @@
                 <a:latin typeface="Arial" pitchFamily="34" charset="0"/>
                 <a:cs typeface="Arial" pitchFamily="34" charset="0"/>
               </a:rPr>
-              <a:t> / Example.java</a:t>
+              <a:t> </a:t>
+            </a:r>
+            <a:r>
+              <a:rPr lang="en-US" sz="1600" smtClean="0">
+                <a:latin typeface="Arial" pitchFamily="34" charset="0"/>
+                <a:cs typeface="Arial" pitchFamily="34" charset="0"/>
+              </a:rPr>
+              <a:t>/ </a:t>
+            </a:r>
+            <a:r>
+              <a:rPr lang="en-US" sz="1600" smtClean="0">
+                <a:latin typeface="Arial" pitchFamily="34" charset="0"/>
+                <a:cs typeface="Arial" pitchFamily="34" charset="0"/>
+              </a:rPr>
+              <a:t>ExampleKt.java</a:t>
             </a:r>
             <a:endParaRPr lang="cs-CZ" sz="1600" dirty="0">
               <a:latin typeface="Arial" pitchFamily="34" charset="0"/>

</xml_diff>